<commit_message>
added in real world examples
</commit_message>
<xml_diff>
--- a/DAPC_Info_523_RPM_BJMM.pptx
+++ b/DAPC_Info_523_RPM_BJMM.pptx
@@ -5,7 +5,7 @@
     <p:sldMasterId id="2147483670" r:id="rId1"/>
   </p:sldMasterIdLst>
   <p:notesMasterIdLst>
-    <p:notesMasterId r:id="rId25"/>
+    <p:notesMasterId r:id="rId27"/>
   </p:notesMasterIdLst>
   <p:sldIdLst>
     <p:sldId id="269" r:id="rId2"/>
@@ -18,19 +18,21 @@
     <p:sldId id="277" r:id="rId9"/>
     <p:sldId id="289" r:id="rId10"/>
     <p:sldId id="285" r:id="rId11"/>
-    <p:sldId id="284" r:id="rId12"/>
-    <p:sldId id="278" r:id="rId13"/>
-    <p:sldId id="286" r:id="rId14"/>
-    <p:sldId id="279" r:id="rId15"/>
-    <p:sldId id="280" r:id="rId16"/>
-    <p:sldId id="281" r:id="rId17"/>
-    <p:sldId id="287" r:id="rId18"/>
-    <p:sldId id="282" r:id="rId19"/>
-    <p:sldId id="268" r:id="rId20"/>
-    <p:sldId id="272" r:id="rId21"/>
-    <p:sldId id="274" r:id="rId22"/>
-    <p:sldId id="275" r:id="rId23"/>
-    <p:sldId id="276" r:id="rId24"/>
+    <p:sldId id="294" r:id="rId12"/>
+    <p:sldId id="284" r:id="rId13"/>
+    <p:sldId id="278" r:id="rId14"/>
+    <p:sldId id="286" r:id="rId15"/>
+    <p:sldId id="279" r:id="rId16"/>
+    <p:sldId id="280" r:id="rId17"/>
+    <p:sldId id="281" r:id="rId18"/>
+    <p:sldId id="287" r:id="rId19"/>
+    <p:sldId id="282" r:id="rId20"/>
+    <p:sldId id="268" r:id="rId21"/>
+    <p:sldId id="295" r:id="rId22"/>
+    <p:sldId id="272" r:id="rId23"/>
+    <p:sldId id="274" r:id="rId24"/>
+    <p:sldId id="275" r:id="rId25"/>
+    <p:sldId id="276" r:id="rId26"/>
   </p:sldIdLst>
   <p:sldSz cx="18288000" cy="10287000"/>
   <p:notesSz cx="18288000" cy="10287000"/>
@@ -144,6 +146,7 @@
             <p14:sldId id="277"/>
             <p14:sldId id="289"/>
             <p14:sldId id="285"/>
+            <p14:sldId id="294"/>
             <p14:sldId id="284"/>
             <p14:sldId id="278"/>
             <p14:sldId id="286"/>
@@ -153,6 +156,7 @@
             <p14:sldId id="287"/>
             <p14:sldId id="282"/>
             <p14:sldId id="268"/>
+            <p14:sldId id="295"/>
           </p14:sldIdLst>
         </p14:section>
         <p14:section name="Backup" id="{4639FF53-061F-4BE1-8E85-8F07C64F0914}">
@@ -11706,6 +11710,261 @@
       </p:grpSpPr>
       <p:sp>
         <p:nvSpPr>
+          <p:cNvPr id="2" name="object 2"/>
+          <p:cNvSpPr txBox="1">
+            <a:spLocks noGrp="1"/>
+          </p:cNvSpPr>
+          <p:nvPr>
+            <p:ph type="title" idx="4294967295"/>
+          </p:nvPr>
+        </p:nvSpPr>
+        <p:spPr>
+          <a:xfrm>
+            <a:off x="2362200" y="1028700"/>
+            <a:ext cx="10352088" cy="936625"/>
+          </a:xfrm>
+          <a:prstGeom prst="rect">
+            <a:avLst/>
+          </a:prstGeom>
+        </p:spPr>
+        <p:txBody>
+          <a:bodyPr vert="horz" wrap="square" lIns="0" tIns="12700" rIns="0" bIns="0" rtlCol="0">
+            <a:noAutofit/>
+          </a:bodyPr>
+          <a:lstStyle/>
+          <a:p>
+            <a:pPr marL="12700">
+              <a:lnSpc>
+                <a:spcPct val="100000"/>
+              </a:lnSpc>
+              <a:spcBef>
+                <a:spcPts val="100"/>
+              </a:spcBef>
+            </a:pPr>
+            <a:r>
+              <a:rPr lang="en-US" sz="6000" b="0" dirty="0">
+                <a:solidFill>
+                  <a:srgbClr val="0C234B"/>
+                </a:solidFill>
+                <a:latin typeface="Aptos Display" panose="020B0004020202020204" pitchFamily="34" charset="0"/>
+                <a:cs typeface="Times New Roman" panose="02020603050405020304" pitchFamily="18" charset="0"/>
+              </a:rPr>
+              <a:t>Clustering Methods</a:t>
+            </a:r>
+            <a:endParaRPr sz="6000" b="0" dirty="0">
+              <a:solidFill>
+                <a:srgbClr val="0C234B"/>
+              </a:solidFill>
+              <a:latin typeface="Aptos Display" panose="020B0004020202020204" pitchFamily="34" charset="0"/>
+              <a:cs typeface="Times New Roman" panose="02020603050405020304" pitchFamily="18" charset="0"/>
+            </a:endParaRPr>
+          </a:p>
+        </p:txBody>
+      </p:sp>
+      <p:sp>
+        <p:nvSpPr>
+          <p:cNvPr id="3" name="Rectangle 1">
+            <a:extLst>
+              <a:ext uri="{FF2B5EF4-FFF2-40B4-BE49-F238E27FC236}">
+                <a16:creationId xmlns:a16="http://schemas.microsoft.com/office/drawing/2014/main" id="{66D94230-EB5B-A114-B286-805849AC9DD8}"/>
+              </a:ext>
+            </a:extLst>
+          </p:cNvPr>
+          <p:cNvSpPr>
+            <a:spLocks noChangeArrowheads="1"/>
+          </p:cNvSpPr>
+          <p:nvPr/>
+        </p:nvSpPr>
+        <p:spPr bwMode="auto">
+          <a:xfrm>
+            <a:off x="2362200" y="2476500"/>
+            <a:ext cx="13563600" cy="2862322"/>
+          </a:xfrm>
+          <a:prstGeom prst="rect">
+            <a:avLst/>
+          </a:prstGeom>
+          <a:noFill/>
+          <a:ln>
+            <a:noFill/>
+          </a:ln>
+          <a:effectLst/>
+          <a:extLst>
+            <a:ext uri="{909E8E84-426E-40DD-AFC4-6F175D3DCCD1}">
+              <a14:hiddenFill xmlns:a14="http://schemas.microsoft.com/office/drawing/2010/main">
+                <a:solidFill>
+                  <a:schemeClr val="accent1"/>
+                </a:solidFill>
+              </a14:hiddenFill>
+            </a:ext>
+            <a:ext uri="{91240B29-F687-4F45-9708-019B960494DF}">
+              <a14:hiddenLine xmlns:a14="http://schemas.microsoft.com/office/drawing/2010/main" w="9525">
+                <a:solidFill>
+                  <a:schemeClr val="tx1"/>
+                </a:solidFill>
+                <a:miter lim="800000"/>
+                <a:headEnd/>
+                <a:tailEnd/>
+              </a14:hiddenLine>
+            </a:ext>
+            <a:ext uri="{AF507438-7753-43E0-B8FC-AC1667EBCBE1}">
+              <a14:hiddenEffects xmlns:a14="http://schemas.microsoft.com/office/drawing/2010/main">
+                <a:effectLst>
+                  <a:outerShdw dist="35921" dir="2700000" algn="ctr" rotWithShape="0">
+                    <a:schemeClr val="bg2"/>
+                  </a:outerShdw>
+                </a:effectLst>
+              </a14:hiddenEffects>
+            </a:ext>
+          </a:extLst>
+        </p:spPr>
+        <p:txBody>
+          <a:bodyPr vert="horz" wrap="square" lIns="91440" tIns="45720" rIns="91440" bIns="45720" numCol="1" anchor="t" anchorCtr="0" compatLnSpc="1">
+            <a:prstTxWarp prst="textNoShape">
+              <a:avLst/>
+            </a:prstTxWarp>
+            <a:spAutoFit/>
+          </a:bodyPr>
+          <a:lstStyle/>
+          <a:p>
+            <a:pPr marR="0" lvl="0" algn="l" defTabSz="914400" rtl="0" eaLnBrk="0" fontAlgn="base" latinLnBrk="0" hangingPunct="0">
+              <a:lnSpc>
+                <a:spcPct val="100000"/>
+              </a:lnSpc>
+              <a:spcBef>
+                <a:spcPct val="0"/>
+              </a:spcBef>
+              <a:spcAft>
+                <a:spcPct val="0"/>
+              </a:spcAft>
+              <a:buClrTx/>
+              <a:buSzTx/>
+              <a:tabLst/>
+            </a:pPr>
+            <a:r>
+              <a:rPr kumimoji="0" lang="en-US" altLang="en-US" sz="3600" b="0" i="0" u="none" strike="noStrike" cap="none" normalizeH="0" baseline="0" dirty="0">
+                <a:ln>
+                  <a:noFill/>
+                </a:ln>
+                <a:solidFill>
+                  <a:schemeClr val="tx1"/>
+                </a:solidFill>
+                <a:effectLst/>
+                <a:latin typeface="Aptos" panose="020B0004020202020204" pitchFamily="34" charset="0"/>
+              </a:rPr>
+              <a:t>Builds on clustering methods studied in class</a:t>
+            </a:r>
+          </a:p>
+          <a:p>
+            <a:pPr marL="571500" marR="0" lvl="0" indent="-571500" algn="l" defTabSz="914400" rtl="0" eaLnBrk="0" fontAlgn="base" latinLnBrk="0" hangingPunct="0">
+              <a:lnSpc>
+                <a:spcPct val="100000"/>
+              </a:lnSpc>
+              <a:spcBef>
+                <a:spcPct val="0"/>
+              </a:spcBef>
+              <a:spcAft>
+                <a:spcPct val="0"/>
+              </a:spcAft>
+              <a:buClrTx/>
+              <a:buSzTx/>
+              <a:buFont typeface="Arial" panose="020B0604020202020204" pitchFamily="34" charset="0"/>
+              <a:buChar char="•"/>
+              <a:tabLst/>
+            </a:pPr>
+            <a:r>
+              <a:rPr lang="en-US" altLang="en-US" sz="3600" dirty="0">
+                <a:latin typeface="Aptos" panose="020B0004020202020204" pitchFamily="34" charset="0"/>
+              </a:rPr>
+              <a:t>Uses K-means to establish ideal number of clusters prior to running DACP</a:t>
+            </a:r>
+          </a:p>
+          <a:p>
+            <a:pPr marL="1028700" lvl="1" indent="-571500" eaLnBrk="0" fontAlgn="base" hangingPunct="0">
+              <a:spcBef>
+                <a:spcPct val="0"/>
+              </a:spcBef>
+              <a:spcAft>
+                <a:spcPct val="0"/>
+              </a:spcAft>
+              <a:buFont typeface="Arial" panose="020B0604020202020204" pitchFamily="34" charset="0"/>
+              <a:buChar char="•"/>
+            </a:pPr>
+            <a:r>
+              <a:rPr kumimoji="0" lang="en-US" altLang="en-US" sz="3600" b="0" i="0" u="none" strike="noStrike" cap="none" normalizeH="0" baseline="0" dirty="0">
+                <a:ln>
+                  <a:noFill/>
+                </a:ln>
+                <a:solidFill>
+                  <a:schemeClr val="tx1"/>
+                </a:solidFill>
+                <a:effectLst/>
+                <a:latin typeface="Aptos" panose="020B0004020202020204" pitchFamily="34" charset="0"/>
+              </a:rPr>
+              <a:t>Run successive K-means with </a:t>
+            </a:r>
+            <a:r>
+              <a:rPr lang="en-US" altLang="en-US" sz="3600" dirty="0">
+                <a:latin typeface="Aptos" panose="020B0004020202020204" pitchFamily="34" charset="0"/>
+              </a:rPr>
+              <a:t>increasing number of clusters to determine </a:t>
+            </a:r>
+            <a:r>
+              <a:rPr lang="en-US" altLang="en-US" sz="3600" i="1" dirty="0">
+                <a:latin typeface="Aptos" panose="020B0004020202020204" pitchFamily="34" charset="0"/>
+              </a:rPr>
+              <a:t>K</a:t>
+            </a:r>
+            <a:r>
+              <a:rPr lang="en-US" altLang="en-US" sz="3600" dirty="0">
+                <a:latin typeface="Aptos" panose="020B0004020202020204" pitchFamily="34" charset="0"/>
+              </a:rPr>
+              <a:t>.</a:t>
+            </a:r>
+            <a:endParaRPr kumimoji="0" lang="en-US" altLang="en-US" sz="3600" b="0" i="0" u="none" strike="noStrike" cap="none" normalizeH="0" baseline="0" dirty="0">
+              <a:ln>
+                <a:noFill/>
+              </a:ln>
+              <a:solidFill>
+                <a:schemeClr val="tx1"/>
+              </a:solidFill>
+              <a:effectLst/>
+              <a:latin typeface="Aptos" panose="020B0004020202020204" pitchFamily="34" charset="0"/>
+            </a:endParaRPr>
+          </a:p>
+        </p:txBody>
+      </p:sp>
+    </p:spTree>
+    <p:extLst>
+      <p:ext uri="{BB962C8B-B14F-4D97-AF65-F5344CB8AC3E}">
+        <p14:creationId xmlns:p14="http://schemas.microsoft.com/office/powerpoint/2010/main" val="3350421465"/>
+      </p:ext>
+    </p:extLst>
+  </p:cSld>
+  <p:clrMapOvr>
+    <a:masterClrMapping/>
+  </p:clrMapOvr>
+</p:sld>
+</file>
+
+<file path=ppt/slides/slide12.xml><?xml version="1.0" encoding="utf-8"?>
+<p:sld xmlns:a="http://schemas.openxmlformats.org/drawingml/2006/main" xmlns:r="http://schemas.openxmlformats.org/officeDocument/2006/relationships" xmlns:p="http://schemas.openxmlformats.org/presentationml/2006/main">
+  <p:cSld>
+    <p:spTree>
+      <p:nvGrpSpPr>
+        <p:cNvPr id="1" name=""/>
+        <p:cNvGrpSpPr/>
+        <p:nvPr/>
+      </p:nvGrpSpPr>
+      <p:grpSpPr>
+        <a:xfrm>
+          <a:off x="0" y="0"/>
+          <a:ext cx="0" cy="0"/>
+          <a:chOff x="0" y="0"/>
+          <a:chExt cx="0" cy="0"/>
+        </a:xfrm>
+      </p:grpSpPr>
+      <p:sp>
+        <p:nvSpPr>
           <p:cNvPr id="2" name="TextBox 1">
             <a:extLst>
               <a:ext uri="{FF2B5EF4-FFF2-40B4-BE49-F238E27FC236}">
@@ -11764,7 +12023,7 @@
 </p:sld>
 </file>
 
-<file path=ppt/slides/slide12.xml><?xml version="1.0" encoding="utf-8"?>
+<file path=ppt/slides/slide13.xml><?xml version="1.0" encoding="utf-8"?>
 <p:sld xmlns:a="http://schemas.openxmlformats.org/drawingml/2006/main" xmlns:r="http://schemas.openxmlformats.org/officeDocument/2006/relationships" xmlns:p="http://schemas.openxmlformats.org/presentationml/2006/main">
   <p:cSld>
     <p:spTree>
@@ -11816,7 +12075,7 @@
             </a:pPr>
             <a:r>
               <a:rPr lang="en-US" sz="6000" dirty="0"/>
-              <a:t>Real-World Applications</a:t>
+              <a:t>Detecting virus strains</a:t>
             </a:r>
             <a:endParaRPr sz="6000" b="0" dirty="0">
               <a:solidFill>
@@ -11844,8 +12103,8 @@
         </p:nvSpPr>
         <p:spPr bwMode="auto">
           <a:xfrm>
-            <a:off x="2362200" y="2476500"/>
-            <a:ext cx="8610600" cy="1200329"/>
+            <a:off x="2362200" y="2724150"/>
+            <a:ext cx="6781800" cy="4524315"/>
           </a:xfrm>
           <a:prstGeom prst="rect">
             <a:avLst/>
@@ -11885,7 +12144,7 @@
           </a:extLst>
         </p:spPr>
         <p:txBody>
-          <a:bodyPr vert="horz" wrap="square" lIns="91440" tIns="45720" rIns="91440" bIns="45720" numCol="1" anchor="ctr" anchorCtr="0" compatLnSpc="1">
+          <a:bodyPr vert="horz" wrap="square" lIns="91440" tIns="45720" rIns="91440" bIns="45720" numCol="1" anchor="t" anchorCtr="0" compatLnSpc="1">
             <a:prstTxWarp prst="textNoShape">
               <a:avLst/>
             </a:prstTxWarp>
@@ -11893,7 +12152,7 @@
           </a:bodyPr>
           <a:lstStyle/>
           <a:p>
-            <a:pPr marL="0" marR="0" lvl="0" indent="0" algn="l" defTabSz="914400" rtl="0" eaLnBrk="0" fontAlgn="base" latinLnBrk="0" hangingPunct="0">
+            <a:pPr marR="0" lvl="0" algn="l" defTabSz="914400" rtl="0" eaLnBrk="0" fontAlgn="base" latinLnBrk="0" hangingPunct="0">
               <a:lnSpc>
                 <a:spcPct val="100000"/>
               </a:lnSpc>
@@ -11905,11 +12164,108 @@
               </a:spcAft>
               <a:buClrTx/>
               <a:buSzTx/>
-              <a:buFontTx/>
-              <a:buNone/>
               <a:tabLst/>
             </a:pPr>
-            <a:endParaRPr kumimoji="0" lang="en-US" altLang="en-US" sz="1800" b="0" i="0" u="none" strike="noStrike" cap="none" normalizeH="0" baseline="0">
+            <a:r>
+              <a:rPr kumimoji="0" lang="en-US" altLang="en-US" sz="2400" b="0" i="0" u="none" strike="noStrike" cap="none" normalizeH="0" baseline="0" dirty="0">
+                <a:ln>
+                  <a:noFill/>
+                </a:ln>
+                <a:solidFill>
+                  <a:schemeClr val="tx1"/>
+                </a:solidFill>
+                <a:effectLst/>
+                <a:latin typeface="Arial" panose="020B0604020202020204" pitchFamily="34" charset="0"/>
+              </a:rPr>
+              <a:t>In an analysis performed by </a:t>
+            </a:r>
+            <a:r>
+              <a:rPr kumimoji="0" lang="de-DE" altLang="en-US" sz="2400" b="0" i="0" u="none" strike="noStrike" cap="none" normalizeH="0" baseline="0" dirty="0">
+                <a:ln>
+                  <a:noFill/>
+                </a:ln>
+                <a:solidFill>
+                  <a:schemeClr val="tx1"/>
+                </a:solidFill>
+                <a:effectLst/>
+                <a:latin typeface="Arial" panose="020B0604020202020204" pitchFamily="34" charset="0"/>
+              </a:rPr>
+              <a:t>Grünwald, Kamvar, and Everhart, they used the H3N2 dataset and DACP to study genetic variations in the virus. They found that from the years 2001-2005 the virus varied slightly but not to a significant degree. </a:t>
+            </a:r>
+            <a:r>
+              <a:rPr lang="de-DE" altLang="en-US" sz="2400" dirty="0">
+                <a:latin typeface="Arial" panose="020B0604020202020204" pitchFamily="34" charset="0"/>
+              </a:rPr>
+              <a:t>I</a:t>
+            </a:r>
+            <a:r>
+              <a:rPr kumimoji="0" lang="de-DE" altLang="en-US" sz="2400" b="0" i="0" u="none" strike="noStrike" cap="none" normalizeH="0" baseline="0" dirty="0">
+                <a:ln>
+                  <a:noFill/>
+                </a:ln>
+                <a:solidFill>
+                  <a:schemeClr val="tx1"/>
+                </a:solidFill>
+                <a:effectLst/>
+                <a:latin typeface="Arial" panose="020B0604020202020204" pitchFamily="34" charset="0"/>
+              </a:rPr>
+              <a:t>n 2006, however, the virus appeared to undergo a large mutation to the point where it became genetically distinct (see graph).</a:t>
+            </a:r>
+          </a:p>
+          <a:p>
+            <a:pPr marR="0" lvl="0" algn="l" defTabSz="914400" rtl="0" eaLnBrk="0" fontAlgn="base" latinLnBrk="0" hangingPunct="0">
+              <a:lnSpc>
+                <a:spcPct val="100000"/>
+              </a:lnSpc>
+              <a:spcBef>
+                <a:spcPct val="0"/>
+              </a:spcBef>
+              <a:spcAft>
+                <a:spcPct val="0"/>
+              </a:spcAft>
+              <a:buClrTx/>
+              <a:buSzTx/>
+              <a:tabLst/>
+            </a:pPr>
+            <a:endParaRPr lang="de-DE" altLang="en-US" sz="2400" dirty="0">
+              <a:latin typeface="Arial" panose="020B0604020202020204" pitchFamily="34" charset="0"/>
+            </a:endParaRPr>
+          </a:p>
+          <a:p>
+            <a:pPr marR="0" lvl="0" algn="l" defTabSz="914400" rtl="0" eaLnBrk="0" fontAlgn="base" latinLnBrk="0" hangingPunct="0">
+              <a:lnSpc>
+                <a:spcPct val="100000"/>
+              </a:lnSpc>
+              <a:spcBef>
+                <a:spcPct val="0"/>
+              </a:spcBef>
+              <a:spcAft>
+                <a:spcPct val="0"/>
+              </a:spcAft>
+              <a:buClrTx/>
+              <a:buSzTx/>
+              <a:tabLst/>
+            </a:pPr>
+            <a:r>
+              <a:rPr kumimoji="0" lang="de-DE" altLang="en-US" sz="2400" b="0" i="0" u="none" strike="noStrike" cap="none" normalizeH="0" baseline="0" dirty="0">
+                <a:ln>
+                  <a:noFill/>
+                </a:ln>
+                <a:solidFill>
+                  <a:schemeClr val="tx1"/>
+                </a:solidFill>
+                <a:effectLst/>
+                <a:latin typeface="Arial" panose="020B0604020202020204" pitchFamily="34" charset="0"/>
+              </a:rPr>
+              <a:t>Using DACP they were able to </a:t>
+            </a:r>
+            <a:r>
+              <a:rPr lang="de-DE" altLang="en-US" sz="2400" dirty="0">
+                <a:latin typeface="Arial" panose="020B0604020202020204" pitchFamily="34" charset="0"/>
+              </a:rPr>
+              <a:t>isolate two new alleles that appeared in 2004 and 2005 that were the cause of the observed mutation.</a:t>
+            </a:r>
+            <a:endParaRPr kumimoji="0" lang="en-US" altLang="en-US" sz="2400" b="0" i="0" u="none" strike="noStrike" cap="none" normalizeH="0" baseline="0" dirty="0">
               <a:ln>
                 <a:noFill/>
               </a:ln>
@@ -11920,101 +12276,55 @@
               <a:latin typeface="Arial" panose="020B0604020202020204" pitchFamily="34" charset="0"/>
             </a:endParaRPr>
           </a:p>
-          <a:p>
-            <a:pPr marL="0" marR="0" lvl="0" indent="0" algn="l" defTabSz="914400" rtl="0" eaLnBrk="0" fontAlgn="base" latinLnBrk="0" hangingPunct="0">
-              <a:lnSpc>
-                <a:spcPct val="100000"/>
-              </a:lnSpc>
-              <a:spcBef>
-                <a:spcPct val="0"/>
-              </a:spcBef>
-              <a:spcAft>
-                <a:spcPct val="0"/>
-              </a:spcAft>
-              <a:buClrTx/>
-              <a:buSzTx/>
-              <a:buFontTx/>
-              <a:buChar char="•"/>
-              <a:tabLst/>
-            </a:pPr>
-            <a:r>
-              <a:rPr kumimoji="0" lang="en-US" altLang="en-US" sz="1800" b="0" i="0" u="none" strike="noStrike" cap="none" normalizeH="0" baseline="0">
-                <a:ln>
-                  <a:noFill/>
-                </a:ln>
-                <a:solidFill>
-                  <a:schemeClr val="tx1"/>
-                </a:solidFill>
-                <a:effectLst/>
-                <a:latin typeface="Arial" panose="020B0604020202020204" pitchFamily="34" charset="0"/>
-              </a:rPr>
-              <a:t>Examples: Genomics, Ecology, Medical Diagnostics, Marketing, Finance.</a:t>
-            </a:r>
-          </a:p>
-          <a:p>
-            <a:pPr marL="0" marR="0" lvl="0" indent="0" algn="l" defTabSz="914400" rtl="0" eaLnBrk="0" fontAlgn="base" latinLnBrk="0" hangingPunct="0">
-              <a:lnSpc>
-                <a:spcPct val="100000"/>
-              </a:lnSpc>
-              <a:spcBef>
-                <a:spcPct val="0"/>
-              </a:spcBef>
-              <a:spcAft>
-                <a:spcPct val="0"/>
-              </a:spcAft>
-              <a:buClrTx/>
-              <a:buSzTx/>
-              <a:buFontTx/>
-              <a:buChar char="•"/>
-              <a:tabLst/>
-            </a:pPr>
-            <a:r>
-              <a:rPr kumimoji="0" lang="en-US" altLang="en-US" sz="1800" b="0" i="0" u="none" strike="noStrike" cap="none" normalizeH="0" baseline="0">
-                <a:ln>
-                  <a:noFill/>
-                </a:ln>
-                <a:solidFill>
-                  <a:schemeClr val="tx1"/>
-                </a:solidFill>
-                <a:effectLst/>
-                <a:latin typeface="Arial" panose="020B0604020202020204" pitchFamily="34" charset="0"/>
-              </a:rPr>
-              <a:t>Brief descriptions of how DAPC is used in these fields.</a:t>
-            </a:r>
-          </a:p>
-          <a:p>
-            <a:pPr marL="0" marR="0" lvl="0" indent="0" algn="l" defTabSz="914400" rtl="0" eaLnBrk="0" fontAlgn="base" latinLnBrk="0" hangingPunct="0">
-              <a:lnSpc>
-                <a:spcPct val="100000"/>
-              </a:lnSpc>
-              <a:spcBef>
-                <a:spcPct val="0"/>
-              </a:spcBef>
-              <a:spcAft>
-                <a:spcPct val="0"/>
-              </a:spcAft>
-              <a:buClrTx/>
-              <a:buSzTx/>
-              <a:buFontTx/>
-              <a:buChar char="•"/>
-              <a:tabLst/>
-            </a:pPr>
-            <a:r>
-              <a:rPr kumimoji="0" lang="en-US" altLang="en-US" sz="1800" b="0" i="0" u="none" strike="noStrike" cap="none" normalizeH="0" baseline="0">
-                <a:ln>
-                  <a:noFill/>
-                </a:ln>
-                <a:solidFill>
-                  <a:schemeClr val="tx1"/>
-                </a:solidFill>
-                <a:effectLst/>
-                <a:latin typeface="Arial" panose="020B0604020202020204" pitchFamily="34" charset="0"/>
-              </a:rPr>
-              <a:t>Visual: Icons or images representing different applications. </a:t>
-            </a:r>
-          </a:p>
         </p:txBody>
       </p:sp>
+      <p:pic>
+        <p:nvPicPr>
+          <p:cNvPr id="5124" name="Picture 4">
+            <a:extLst>
+              <a:ext uri="{FF2B5EF4-FFF2-40B4-BE49-F238E27FC236}">
+                <a16:creationId xmlns:a16="http://schemas.microsoft.com/office/drawing/2014/main" id="{270699FE-953F-D659-E61E-C74B626128DC}"/>
+              </a:ext>
+            </a:extLst>
+          </p:cNvPr>
+          <p:cNvPicPr>
+            <a:picLocks noChangeAspect="1" noChangeArrowheads="1"/>
+          </p:cNvPicPr>
+          <p:nvPr/>
+        </p:nvPicPr>
+        <p:blipFill>
+          <a:blip r:embed="rId2">
+            <a:extLst>
+              <a:ext uri="{28A0092B-C50C-407E-A947-70E740481C1C}">
+                <a14:useLocalDpi xmlns:a14="http://schemas.microsoft.com/office/drawing/2010/main" val="0"/>
+              </a:ext>
+            </a:extLst>
+          </a:blip>
+          <a:srcRect/>
+          <a:stretch>
+            <a:fillRect/>
+          </a:stretch>
+        </p:blipFill>
+        <p:spPr bwMode="auto">
+          <a:xfrm>
+            <a:off x="9448800" y="2724150"/>
+            <a:ext cx="8064500" cy="4838700"/>
+          </a:xfrm>
+          <a:prstGeom prst="rect">
+            <a:avLst/>
+          </a:prstGeom>
+          <a:noFill/>
+          <a:extLst>
+            <a:ext uri="{909E8E84-426E-40DD-AFC4-6F175D3DCCD1}">
+              <a14:hiddenFill xmlns:a14="http://schemas.microsoft.com/office/drawing/2010/main">
+                <a:solidFill>
+                  <a:srgbClr val="FFFFFF"/>
+                </a:solidFill>
+              </a14:hiddenFill>
+            </a:ext>
+          </a:extLst>
+        </p:spPr>
+      </p:pic>
     </p:spTree>
     <p:extLst>
       <p:ext uri="{BB962C8B-B14F-4D97-AF65-F5344CB8AC3E}">
@@ -12028,7 +12338,7 @@
 </p:sld>
 </file>
 
-<file path=ppt/slides/slide13.xml><?xml version="1.0" encoding="utf-8"?>
+<file path=ppt/slides/slide14.xml><?xml version="1.0" encoding="utf-8"?>
 <p:sld xmlns:a="http://schemas.openxmlformats.org/drawingml/2006/main" xmlns:r="http://schemas.openxmlformats.org/officeDocument/2006/relationships" xmlns:p="http://schemas.openxmlformats.org/presentationml/2006/main">
   <p:cSld>
     <p:spTree>
@@ -12096,7 +12406,7 @@
 </p:sld>
 </file>
 
-<file path=ppt/slides/slide14.xml><?xml version="1.0" encoding="utf-8"?>
+<file path=ppt/slides/slide15.xml><?xml version="1.0" encoding="utf-8"?>
 <p:sld xmlns:a="http://schemas.openxmlformats.org/drawingml/2006/main" xmlns:r="http://schemas.openxmlformats.org/officeDocument/2006/relationships" xmlns:p="http://schemas.openxmlformats.org/presentationml/2006/main">
   <p:cSld>
     <p:spTree>
@@ -12383,7 +12693,7 @@
 </p:sld>
 </file>
 
-<file path=ppt/slides/slide15.xml><?xml version="1.0" encoding="utf-8"?>
+<file path=ppt/slides/slide16.xml><?xml version="1.0" encoding="utf-8"?>
 <p:sld xmlns:a="http://schemas.openxmlformats.org/drawingml/2006/main" xmlns:r="http://schemas.openxmlformats.org/officeDocument/2006/relationships" xmlns:p="http://schemas.openxmlformats.org/presentationml/2006/main">
   <p:cSld>
     <p:spTree>
@@ -13553,7 +13863,7 @@
 </p:sld>
 </file>
 
-<file path=ppt/slides/slide16.xml><?xml version="1.0" encoding="utf-8"?>
+<file path=ppt/slides/slide17.xml><?xml version="1.0" encoding="utf-8"?>
 <p:sld xmlns:a="http://schemas.openxmlformats.org/drawingml/2006/main" xmlns:r="http://schemas.openxmlformats.org/officeDocument/2006/relationships" xmlns:p="http://schemas.openxmlformats.org/presentationml/2006/main">
   <p:cSld>
     <p:spTree>
@@ -14661,7 +14971,7 @@
 </p:sld>
 </file>
 
-<file path=ppt/slides/slide17.xml><?xml version="1.0" encoding="utf-8"?>
+<file path=ppt/slides/slide18.xml><?xml version="1.0" encoding="utf-8"?>
 <p:sld xmlns:a="http://schemas.openxmlformats.org/drawingml/2006/main" xmlns:r="http://schemas.openxmlformats.org/officeDocument/2006/relationships" xmlns:p="http://schemas.openxmlformats.org/presentationml/2006/main">
   <p:cSld>
     <p:spTree>
@@ -14729,7 +15039,7 @@
 </p:sld>
 </file>
 
-<file path=ppt/slides/slide18.xml><?xml version="1.0" encoding="utf-8"?>
+<file path=ppt/slides/slide19.xml><?xml version="1.0" encoding="utf-8"?>
 <p:sld xmlns:a="http://schemas.openxmlformats.org/drawingml/2006/main" xmlns:r="http://schemas.openxmlformats.org/officeDocument/2006/relationships" xmlns:p="http://schemas.openxmlformats.org/presentationml/2006/main">
   <p:cSld>
     <p:spTree>
@@ -14780,14 +15090,16 @@
               </a:spcBef>
             </a:pPr>
             <a:r>
-              <a:rPr lang="en-US" sz="6000" dirty="0"/>
-              <a:t>Conclusion and Q&amp;A</a:t>
+              <a:rPr lang="en-US" sz="6000" dirty="0">
+                <a:latin typeface="Aptos Display" panose="020B0004020202020204" pitchFamily="34" charset="0"/>
+              </a:rPr>
+              <a:t>Conclusion</a:t>
             </a:r>
             <a:endParaRPr sz="6000" b="0" dirty="0">
               <a:solidFill>
                 <a:srgbClr val="0C234B"/>
               </a:solidFill>
-              <a:latin typeface="Times New Roman" panose="02020603050405020304" pitchFamily="18" charset="0"/>
+              <a:latin typeface="Aptos Display" panose="020B0004020202020204" pitchFamily="34" charset="0"/>
               <a:cs typeface="Times New Roman" panose="02020603050405020304" pitchFamily="18" charset="0"/>
             </a:endParaRPr>
           </a:p>
@@ -14809,8 +15121,8 @@
         </p:nvSpPr>
         <p:spPr bwMode="auto">
           <a:xfrm>
-            <a:off x="2362200" y="1981013"/>
-            <a:ext cx="5410200" cy="1477328"/>
+            <a:off x="2375646" y="2628900"/>
+            <a:ext cx="13550153" cy="1569660"/>
           </a:xfrm>
           <a:prstGeom prst="rect">
             <a:avLst/>
@@ -14850,7 +15162,7 @@
           </a:extLst>
         </p:spPr>
         <p:txBody>
-          <a:bodyPr vert="horz" wrap="square" lIns="91440" tIns="45720" rIns="91440" bIns="45720" numCol="1" anchor="ctr" anchorCtr="0" compatLnSpc="1">
+          <a:bodyPr vert="horz" wrap="square" lIns="91440" tIns="45720" rIns="91440" bIns="45720" numCol="1" anchor="t" anchorCtr="0" compatLnSpc="1">
             <a:prstTxWarp prst="textNoShape">
               <a:avLst/>
             </a:prstTxWarp>
@@ -14858,7 +15170,7 @@
           </a:bodyPr>
           <a:lstStyle/>
           <a:p>
-            <a:pPr marL="0" marR="0" lvl="0" indent="0" algn="l" defTabSz="914400" rtl="0" eaLnBrk="0" fontAlgn="base" latinLnBrk="0" hangingPunct="0">
+            <a:pPr marL="285750" marR="0" lvl="0" indent="-285750" algn="l" defTabSz="914400" rtl="0" eaLnBrk="0" fontAlgn="base" latinLnBrk="0" hangingPunct="0">
               <a:lnSpc>
                 <a:spcPct val="100000"/>
               </a:lnSpc>
@@ -14870,40 +15182,12 @@
               </a:spcAft>
               <a:buClrTx/>
               <a:buSzTx/>
-              <a:buFontTx/>
-              <a:buNone/>
-              <a:tabLst/>
-            </a:pPr>
-            <a:endParaRPr kumimoji="0" lang="en-US" altLang="en-US" sz="1800" b="0" i="0" u="none" strike="noStrike" cap="none" normalizeH="0" baseline="0">
-              <a:ln>
-                <a:noFill/>
-              </a:ln>
-              <a:solidFill>
-                <a:schemeClr val="tx1"/>
-              </a:solidFill>
-              <a:effectLst/>
-              <a:latin typeface="Arial" panose="020B0604020202020204" pitchFamily="34" charset="0"/>
-            </a:endParaRPr>
-          </a:p>
-          <a:p>
-            <a:pPr marL="0" marR="0" lvl="0" indent="0" algn="l" defTabSz="914400" rtl="0" eaLnBrk="0" fontAlgn="base" latinLnBrk="0" hangingPunct="0">
-              <a:lnSpc>
-                <a:spcPct val="100000"/>
-              </a:lnSpc>
-              <a:spcBef>
-                <a:spcPct val="0"/>
-              </a:spcBef>
-              <a:spcAft>
-                <a:spcPct val="0"/>
-              </a:spcAft>
-              <a:buClrTx/>
-              <a:buSzTx/>
-              <a:buFontTx/>
+              <a:buFont typeface="Arial" panose="020B0604020202020204" pitchFamily="34" charset="0"/>
               <a:buChar char="•"/>
               <a:tabLst/>
             </a:pPr>
             <a:r>
-              <a:rPr kumimoji="0" lang="en-US" altLang="en-US" sz="1800" b="0" i="0" u="none" strike="noStrike" cap="none" normalizeH="0" baseline="0">
+              <a:rPr kumimoji="0" lang="en-US" altLang="en-US" sz="3200" b="0" i="0" u="none" strike="noStrike" cap="none" normalizeH="0" baseline="0" dirty="0">
                 <a:ln>
                   <a:noFill/>
                 </a:ln>
@@ -14911,13 +15195,13 @@
                   <a:schemeClr val="tx1"/>
                 </a:solidFill>
                 <a:effectLst/>
-                <a:latin typeface="Arial" panose="020B0604020202020204" pitchFamily="34" charset="0"/>
+                <a:latin typeface="Aptos" panose="020B0004020202020204" pitchFamily="34" charset="0"/>
               </a:rPr>
-              <a:t>Summary of key points.</a:t>
-            </a:r>
-          </a:p>
-          <a:p>
-            <a:pPr marL="0" marR="0" lvl="0" indent="0" algn="l" defTabSz="914400" rtl="0" eaLnBrk="0" fontAlgn="base" latinLnBrk="0" hangingPunct="0">
+              <a:t>DACP is built on running PCA followed by DA</a:t>
+            </a:r>
+          </a:p>
+          <a:p>
+            <a:pPr marL="285750" marR="0" lvl="0" indent="-285750" algn="l" defTabSz="914400" rtl="0" eaLnBrk="0" fontAlgn="base" latinLnBrk="0" hangingPunct="0">
               <a:lnSpc>
                 <a:spcPct val="100000"/>
               </a:lnSpc>
@@ -14929,12 +15213,36 @@
               </a:spcAft>
               <a:buClrTx/>
               <a:buSzTx/>
-              <a:buFontTx/>
+              <a:buFont typeface="Arial" panose="020B0604020202020204" pitchFamily="34" charset="0"/>
               <a:buChar char="•"/>
               <a:tabLst/>
             </a:pPr>
             <a:r>
-              <a:rPr kumimoji="0" lang="en-US" altLang="en-US" sz="1800" b="0" i="0" u="none" strike="noStrike" cap="none" normalizeH="0" baseline="0">
+              <a:rPr lang="en-US" altLang="en-US" sz="3200" dirty="0">
+                <a:latin typeface="Aptos" panose="020B0004020202020204" pitchFamily="34" charset="0"/>
+              </a:rPr>
+              <a:t>Handles larger datasets while increasing performance</a:t>
+            </a:r>
+          </a:p>
+          <a:p>
+            <a:pPr marL="285750" marR="0" lvl="0" indent="-285750" algn="l" defTabSz="914400" rtl="0" eaLnBrk="0" fontAlgn="base" latinLnBrk="0" hangingPunct="0">
+              <a:lnSpc>
+                <a:spcPct val="100000"/>
+              </a:lnSpc>
+              <a:spcBef>
+                <a:spcPct val="0"/>
+              </a:spcBef>
+              <a:spcAft>
+                <a:spcPct val="0"/>
+              </a:spcAft>
+              <a:buClrTx/>
+              <a:buSzTx/>
+              <a:buFont typeface="Arial" panose="020B0604020202020204" pitchFamily="34" charset="0"/>
+              <a:buChar char="•"/>
+              <a:tabLst/>
+            </a:pPr>
+            <a:r>
+              <a:rPr kumimoji="0" lang="en-US" altLang="en-US" sz="3200" b="0" i="0" u="none" strike="noStrike" cap="none" normalizeH="0" baseline="0" dirty="0">
                 <a:ln>
                   <a:noFill/>
                 </a:ln>
@@ -14942,71 +15250,9 @@
                   <a:schemeClr val="tx1"/>
                 </a:solidFill>
                 <a:effectLst/>
-                <a:latin typeface="Arial" panose="020B0604020202020204" pitchFamily="34" charset="0"/>
+                <a:latin typeface="Aptos" panose="020B0004020202020204" pitchFamily="34" charset="0"/>
               </a:rPr>
-              <a:t>Importance of DAPC in data analysis.</a:t>
-            </a:r>
-          </a:p>
-          <a:p>
-            <a:pPr marL="0" marR="0" lvl="0" indent="0" algn="l" defTabSz="914400" rtl="0" eaLnBrk="0" fontAlgn="base" latinLnBrk="0" hangingPunct="0">
-              <a:lnSpc>
-                <a:spcPct val="100000"/>
-              </a:lnSpc>
-              <a:spcBef>
-                <a:spcPct val="0"/>
-              </a:spcBef>
-              <a:spcAft>
-                <a:spcPct val="0"/>
-              </a:spcAft>
-              <a:buClrTx/>
-              <a:buSzTx/>
-              <a:buFontTx/>
-              <a:buChar char="•"/>
-              <a:tabLst/>
-            </a:pPr>
-            <a:r>
-              <a:rPr kumimoji="0" lang="en-US" altLang="en-US" sz="1800" b="0" i="0" u="none" strike="noStrike" cap="none" normalizeH="0" baseline="0">
-                <a:ln>
-                  <a:noFill/>
-                </a:ln>
-                <a:solidFill>
-                  <a:schemeClr val="tx1"/>
-                </a:solidFill>
-                <a:effectLst/>
-                <a:latin typeface="Arial" panose="020B0604020202020204" pitchFamily="34" charset="0"/>
-              </a:rPr>
-              <a:t>Invitation for questions.</a:t>
-            </a:r>
-          </a:p>
-          <a:p>
-            <a:pPr marL="0" marR="0" lvl="0" indent="0" algn="l" defTabSz="914400" rtl="0" eaLnBrk="0" fontAlgn="base" latinLnBrk="0" hangingPunct="0">
-              <a:lnSpc>
-                <a:spcPct val="100000"/>
-              </a:lnSpc>
-              <a:spcBef>
-                <a:spcPct val="0"/>
-              </a:spcBef>
-              <a:spcAft>
-                <a:spcPct val="0"/>
-              </a:spcAft>
-              <a:buClrTx/>
-              <a:buSzTx/>
-              <a:buFontTx/>
-              <a:buChar char="•"/>
-              <a:tabLst/>
-            </a:pPr>
-            <a:r>
-              <a:rPr kumimoji="0" lang="en-US" altLang="en-US" sz="1800" b="0" i="0" u="none" strike="noStrike" cap="none" normalizeH="0" baseline="0">
-                <a:ln>
-                  <a:noFill/>
-                </a:ln>
-                <a:solidFill>
-                  <a:schemeClr val="tx1"/>
-                </a:solidFill>
-                <a:effectLst/>
-                <a:latin typeface="Arial" panose="020B0604020202020204" pitchFamily="34" charset="0"/>
-              </a:rPr>
-              <a:t>Visual: Summary bullet points. </a:t>
+              <a:t>Excellent resource for studying genetic data</a:t>
             </a:r>
           </a:p>
         </p:txBody>
@@ -15024,7 +15270,75 @@
 </p:sld>
 </file>
 
-<file path=ppt/slides/slide19.xml><?xml version="1.0" encoding="utf-8"?>
+<file path=ppt/slides/slide2.xml><?xml version="1.0" encoding="utf-8"?>
+<p:sld xmlns:a="http://schemas.openxmlformats.org/drawingml/2006/main" xmlns:r="http://schemas.openxmlformats.org/officeDocument/2006/relationships" xmlns:p="http://schemas.openxmlformats.org/presentationml/2006/main">
+  <p:cSld>
+    <p:spTree>
+      <p:nvGrpSpPr>
+        <p:cNvPr id="1" name=""/>
+        <p:cNvGrpSpPr/>
+        <p:nvPr/>
+      </p:nvGrpSpPr>
+      <p:grpSpPr>
+        <a:xfrm>
+          <a:off x="0" y="0"/>
+          <a:ext cx="0" cy="0"/>
+          <a:chOff x="0" y="0"/>
+          <a:chExt cx="0" cy="0"/>
+        </a:xfrm>
+      </p:grpSpPr>
+      <p:sp>
+        <p:nvSpPr>
+          <p:cNvPr id="2" name="TextBox 1">
+            <a:extLst>
+              <a:ext uri="{FF2B5EF4-FFF2-40B4-BE49-F238E27FC236}">
+                <a16:creationId xmlns:a16="http://schemas.microsoft.com/office/drawing/2014/main" id="{7A3917FB-9318-B75A-2B17-4E1FDD2B3267}"/>
+              </a:ext>
+            </a:extLst>
+          </p:cNvPr>
+          <p:cNvSpPr txBox="1"/>
+          <p:nvPr/>
+        </p:nvSpPr>
+        <p:spPr>
+          <a:xfrm>
+            <a:off x="3017520" y="3620006"/>
+            <a:ext cx="12252960" cy="1569660"/>
+          </a:xfrm>
+          <a:prstGeom prst="rect">
+            <a:avLst/>
+          </a:prstGeom>
+          <a:noFill/>
+        </p:spPr>
+        <p:txBody>
+          <a:bodyPr wrap="square" rtlCol="0">
+            <a:spAutoFit/>
+          </a:bodyPr>
+          <a:lstStyle/>
+          <a:p>
+            <a:pPr algn="ctr"/>
+            <a:r>
+              <a:rPr lang="en-US" sz="9600" dirty="0">
+                <a:latin typeface="Aptos Display" panose="020B0004020202020204" pitchFamily="34" charset="0"/>
+              </a:rPr>
+              <a:t>Background Information</a:t>
+            </a:r>
+          </a:p>
+        </p:txBody>
+      </p:sp>
+    </p:spTree>
+    <p:extLst>
+      <p:ext uri="{BB962C8B-B14F-4D97-AF65-F5344CB8AC3E}">
+        <p14:creationId xmlns:p14="http://schemas.microsoft.com/office/powerpoint/2010/main" val="1253725192"/>
+      </p:ext>
+    </p:extLst>
+  </p:cSld>
+  <p:clrMapOvr>
+    <a:masterClrMapping/>
+  </p:clrMapOvr>
+</p:sld>
+</file>
+
+<file path=ppt/slides/slide20.xml><?xml version="1.0" encoding="utf-8"?>
 <p:sld xmlns:a="http://schemas.openxmlformats.org/drawingml/2006/main" xmlns:r="http://schemas.openxmlformats.org/officeDocument/2006/relationships" xmlns:p="http://schemas.openxmlformats.org/presentationml/2006/main">
   <p:cSld>
     <p:spTree>
@@ -15287,7 +15601,7 @@
 </p:sld>
 </file>
 
-<file path=ppt/slides/slide2.xml><?xml version="1.0" encoding="utf-8"?>
+<file path=ppt/slides/slide21.xml><?xml version="1.0" encoding="utf-8"?>
 <p:sld xmlns:a="http://schemas.openxmlformats.org/drawingml/2006/main" xmlns:r="http://schemas.openxmlformats.org/officeDocument/2006/relationships" xmlns:p="http://schemas.openxmlformats.org/presentationml/2006/main">
   <p:cSld>
     <p:spTree>
@@ -15306,38 +15620,286 @@
       </p:grpSpPr>
       <p:sp>
         <p:nvSpPr>
-          <p:cNvPr id="2" name="TextBox 1">
+          <p:cNvPr id="2" name="object 2"/>
+          <p:cNvSpPr txBox="1">
+            <a:spLocks noGrp="1"/>
+          </p:cNvSpPr>
+          <p:nvPr>
+            <p:ph type="title" idx="4294967295"/>
+          </p:nvPr>
+        </p:nvSpPr>
+        <p:spPr>
+          <a:xfrm>
+            <a:off x="2362200" y="1028700"/>
+            <a:ext cx="10352088" cy="936625"/>
+          </a:xfrm>
+          <a:prstGeom prst="rect">
+            <a:avLst/>
+          </a:prstGeom>
+        </p:spPr>
+        <p:txBody>
+          <a:bodyPr vert="horz" wrap="square" lIns="0" tIns="12700" rIns="0" bIns="0" rtlCol="0">
+            <a:noAutofit/>
+          </a:bodyPr>
+          <a:lstStyle/>
+          <a:p>
+            <a:pPr marL="12700">
+              <a:lnSpc>
+                <a:spcPct val="100000"/>
+              </a:lnSpc>
+              <a:spcBef>
+                <a:spcPts val="100"/>
+              </a:spcBef>
+            </a:pPr>
+            <a:r>
+              <a:rPr lang="en-US" sz="6000" dirty="0">
+                <a:latin typeface="Aptos Display" panose="020B0004020202020204" pitchFamily="34" charset="0"/>
+              </a:rPr>
+              <a:t>References</a:t>
+            </a:r>
+            <a:endParaRPr sz="6000" b="0" dirty="0">
+              <a:solidFill>
+                <a:srgbClr val="0C234B"/>
+              </a:solidFill>
+              <a:latin typeface="Aptos Display" panose="020B0004020202020204" pitchFamily="34" charset="0"/>
+              <a:cs typeface="Times New Roman" panose="02020603050405020304" pitchFamily="18" charset="0"/>
+            </a:endParaRPr>
+          </a:p>
+        </p:txBody>
+      </p:sp>
+      <p:sp>
+        <p:nvSpPr>
+          <p:cNvPr id="3" name="Rectangle 1">
             <a:extLst>
               <a:ext uri="{FF2B5EF4-FFF2-40B4-BE49-F238E27FC236}">
-                <a16:creationId xmlns:a16="http://schemas.microsoft.com/office/drawing/2014/main" id="{7A3917FB-9318-B75A-2B17-4E1FDD2B3267}"/>
+                <a16:creationId xmlns:a16="http://schemas.microsoft.com/office/drawing/2014/main" id="{2A21E542-CD9B-B9FB-F7D1-96340EF68D40}"/>
               </a:ext>
             </a:extLst>
           </p:cNvPr>
-          <p:cNvSpPr txBox="1"/>
+          <p:cNvSpPr>
+            <a:spLocks noChangeArrowheads="1"/>
+          </p:cNvSpPr>
           <p:nvPr/>
         </p:nvSpPr>
-        <p:spPr>
+        <p:spPr bwMode="auto">
           <a:xfrm>
-            <a:off x="3017520" y="3620006"/>
-            <a:ext cx="12252960" cy="1569660"/>
+            <a:off x="2362200" y="2535011"/>
+            <a:ext cx="12496800" cy="1938992"/>
           </a:xfrm>
           <a:prstGeom prst="rect">
             <a:avLst/>
           </a:prstGeom>
           <a:noFill/>
+          <a:ln>
+            <a:noFill/>
+          </a:ln>
+          <a:effectLst/>
+          <a:extLst>
+            <a:ext uri="{909E8E84-426E-40DD-AFC4-6F175D3DCCD1}">
+              <a14:hiddenFill xmlns:a14="http://schemas.microsoft.com/office/drawing/2010/main">
+                <a:solidFill>
+                  <a:schemeClr val="accent1"/>
+                </a:solidFill>
+              </a14:hiddenFill>
+            </a:ext>
+            <a:ext uri="{91240B29-F687-4F45-9708-019B960494DF}">
+              <a14:hiddenLine xmlns:a14="http://schemas.microsoft.com/office/drawing/2010/main" w="9525">
+                <a:solidFill>
+                  <a:schemeClr val="tx1"/>
+                </a:solidFill>
+                <a:miter lim="800000"/>
+                <a:headEnd/>
+                <a:tailEnd/>
+              </a14:hiddenLine>
+            </a:ext>
+            <a:ext uri="{AF507438-7753-43E0-B8FC-AC1667EBCBE1}">
+              <a14:hiddenEffects xmlns:a14="http://schemas.microsoft.com/office/drawing/2010/main">
+                <a:effectLst>
+                  <a:outerShdw dist="35921" dir="2700000" algn="ctr" rotWithShape="0">
+                    <a:schemeClr val="bg2"/>
+                  </a:outerShdw>
+                </a:effectLst>
+              </a14:hiddenEffects>
+            </a:ext>
+          </a:extLst>
         </p:spPr>
         <p:txBody>
-          <a:bodyPr wrap="square" rtlCol="0">
+          <a:bodyPr vert="horz" wrap="square" lIns="91440" tIns="45720" rIns="91440" bIns="45720" numCol="1" anchor="t" anchorCtr="0" compatLnSpc="1">
+            <a:prstTxWarp prst="textNoShape">
+              <a:avLst/>
+            </a:prstTxWarp>
             <a:spAutoFit/>
           </a:bodyPr>
           <a:lstStyle/>
           <a:p>
-            <a:pPr algn="ctr"/>
-            <a:r>
-              <a:rPr lang="en-US" sz="9600" dirty="0">
-                <a:latin typeface="Aptos Display" panose="020B0004020202020204" pitchFamily="34" charset="0"/>
+            <a:pPr marL="0" marR="0" lvl="0" indent="0" algn="l" defTabSz="914400" rtl="0" eaLnBrk="0" fontAlgn="base" latinLnBrk="0" hangingPunct="0">
+              <a:lnSpc>
+                <a:spcPct val="100000"/>
+              </a:lnSpc>
+              <a:spcBef>
+                <a:spcPct val="0"/>
+              </a:spcBef>
+              <a:spcAft>
+                <a:spcPct val="0"/>
+              </a:spcAft>
+              <a:buClrTx/>
+              <a:buSzTx/>
+              <a:buFontTx/>
+              <a:buNone/>
+              <a:tabLst/>
+            </a:pPr>
+            <a:r>
+              <a:rPr kumimoji="0" lang="en-US" altLang="en-US" sz="2000" b="0" i="0" u="none" strike="noStrike" cap="none" normalizeH="0" baseline="0" dirty="0" err="1">
+                <a:ln>
+                  <a:noFill/>
+                </a:ln>
+                <a:solidFill>
+                  <a:schemeClr val="tx1"/>
+                </a:solidFill>
+                <a:effectLst/>
+                <a:latin typeface="Aptos" panose="020B0004020202020204" pitchFamily="34" charset="0"/>
               </a:rPr>
-              <a:t>Background Information</a:t>
+              <a:t>Jombart</a:t>
+            </a:r>
+            <a:r>
+              <a:rPr kumimoji="0" lang="en-US" altLang="en-US" sz="2000" b="0" i="0" u="none" strike="noStrike" cap="none" normalizeH="0" baseline="0" dirty="0">
+                <a:ln>
+                  <a:noFill/>
+                </a:ln>
+                <a:solidFill>
+                  <a:schemeClr val="tx1"/>
+                </a:solidFill>
+                <a:effectLst/>
+                <a:latin typeface="Aptos" panose="020B0004020202020204" pitchFamily="34" charset="0"/>
+              </a:rPr>
+              <a:t>, T., </a:t>
+            </a:r>
+            <a:r>
+              <a:rPr kumimoji="0" lang="en-US" altLang="en-US" sz="2000" b="0" i="0" u="none" strike="noStrike" cap="none" normalizeH="0" baseline="0" dirty="0" err="1">
+                <a:ln>
+                  <a:noFill/>
+                </a:ln>
+                <a:solidFill>
+                  <a:schemeClr val="tx1"/>
+                </a:solidFill>
+                <a:effectLst/>
+                <a:latin typeface="Aptos" panose="020B0004020202020204" pitchFamily="34" charset="0"/>
+              </a:rPr>
+              <a:t>Devillard</a:t>
+            </a:r>
+            <a:r>
+              <a:rPr kumimoji="0" lang="en-US" altLang="en-US" sz="2000" b="0" i="0" u="none" strike="noStrike" cap="none" normalizeH="0" baseline="0" dirty="0">
+                <a:ln>
+                  <a:noFill/>
+                </a:ln>
+                <a:solidFill>
+                  <a:schemeClr val="tx1"/>
+                </a:solidFill>
+                <a:effectLst/>
+                <a:latin typeface="Aptos" panose="020B0004020202020204" pitchFamily="34" charset="0"/>
+              </a:rPr>
+              <a:t>, S. &amp; </a:t>
+            </a:r>
+            <a:r>
+              <a:rPr kumimoji="0" lang="en-US" altLang="en-US" sz="2000" b="0" i="0" u="none" strike="noStrike" cap="none" normalizeH="0" baseline="0" dirty="0" err="1">
+                <a:ln>
+                  <a:noFill/>
+                </a:ln>
+                <a:solidFill>
+                  <a:schemeClr val="tx1"/>
+                </a:solidFill>
+                <a:effectLst/>
+                <a:latin typeface="Aptos" panose="020B0004020202020204" pitchFamily="34" charset="0"/>
+              </a:rPr>
+              <a:t>Balloux</a:t>
+            </a:r>
+            <a:r>
+              <a:rPr kumimoji="0" lang="en-US" altLang="en-US" sz="2000" b="0" i="0" u="none" strike="noStrike" cap="none" normalizeH="0" baseline="0" dirty="0">
+                <a:ln>
+                  <a:noFill/>
+                </a:ln>
+                <a:solidFill>
+                  <a:schemeClr val="tx1"/>
+                </a:solidFill>
+                <a:effectLst/>
+                <a:latin typeface="Aptos" panose="020B0004020202020204" pitchFamily="34" charset="0"/>
+              </a:rPr>
+              <a:t>, F. Discriminant analysis of principal components: a new method for the analysis of genetically structured populations. BMC Genet 11, 94 (2010). https://doi.org/10.1186/1471-2156-11-94</a:t>
+            </a:r>
+            <a:endParaRPr kumimoji="0" lang="de-DE" altLang="en-US" sz="2000" b="0" i="0" u="none" strike="noStrike" cap="none" normalizeH="0" baseline="0" dirty="0">
+              <a:ln>
+                <a:noFill/>
+              </a:ln>
+              <a:solidFill>
+                <a:schemeClr val="tx1"/>
+              </a:solidFill>
+              <a:effectLst/>
+              <a:latin typeface="Aptos" panose="020B0004020202020204" pitchFamily="34" charset="0"/>
+            </a:endParaRPr>
+          </a:p>
+          <a:p>
+            <a:pPr marL="0" marR="0" lvl="0" indent="0" algn="l" defTabSz="914400" rtl="0" eaLnBrk="0" fontAlgn="base" latinLnBrk="0" hangingPunct="0">
+              <a:lnSpc>
+                <a:spcPct val="100000"/>
+              </a:lnSpc>
+              <a:spcBef>
+                <a:spcPct val="0"/>
+              </a:spcBef>
+              <a:spcAft>
+                <a:spcPct val="0"/>
+              </a:spcAft>
+              <a:buClrTx/>
+              <a:buSzTx/>
+              <a:buFontTx/>
+              <a:buNone/>
+              <a:tabLst/>
+            </a:pPr>
+            <a:endParaRPr lang="de-DE" altLang="en-US" sz="2000" dirty="0">
+              <a:latin typeface="Aptos" panose="020B0004020202020204" pitchFamily="34" charset="0"/>
+            </a:endParaRPr>
+          </a:p>
+          <a:p>
+            <a:pPr marL="0" marR="0" lvl="0" indent="0" algn="l" defTabSz="914400" rtl="0" eaLnBrk="0" fontAlgn="base" latinLnBrk="0" hangingPunct="0">
+              <a:lnSpc>
+                <a:spcPct val="100000"/>
+              </a:lnSpc>
+              <a:spcBef>
+                <a:spcPct val="0"/>
+              </a:spcBef>
+              <a:spcAft>
+                <a:spcPct val="0"/>
+              </a:spcAft>
+              <a:buClrTx/>
+              <a:buSzTx/>
+              <a:buFontTx/>
+              <a:buNone/>
+              <a:tabLst/>
+            </a:pPr>
+            <a:r>
+              <a:rPr kumimoji="0" lang="de-DE" altLang="en-US" sz="2000" b="0" i="0" u="none" strike="noStrike" cap="none" normalizeH="0" baseline="0" dirty="0">
+                <a:ln>
+                  <a:noFill/>
+                </a:ln>
+                <a:solidFill>
+                  <a:schemeClr val="tx1"/>
+                </a:solidFill>
+                <a:effectLst/>
+                <a:latin typeface="Aptos" panose="020B0004020202020204" pitchFamily="34" charset="0"/>
+              </a:rPr>
+              <a:t>NJ Grünwald, ZN Kamvar, and SE Everhart, </a:t>
+            </a:r>
+            <a:r>
+              <a:rPr kumimoji="0" lang="en-US" altLang="en-US" sz="2000" b="0" i="0" u="none" strike="noStrike" cap="none" normalizeH="0" baseline="0" dirty="0">
+                <a:ln>
+                  <a:noFill/>
+                </a:ln>
+                <a:solidFill>
+                  <a:schemeClr val="tx1"/>
+                </a:solidFill>
+                <a:effectLst/>
+                <a:latin typeface="Aptos" panose="020B0004020202020204" pitchFamily="34" charset="0"/>
+              </a:rPr>
+              <a:t>Discriminant analysis of principal components (DAPC), Available at: https://grunwaldlab.github.io/Population_Genetics_in_R/DAPC.html</a:t>
             </a:r>
           </a:p>
         </p:txBody>
@@ -15345,7 +15907,7 @@
     </p:spTree>
     <p:extLst>
       <p:ext uri="{BB962C8B-B14F-4D97-AF65-F5344CB8AC3E}">
-        <p14:creationId xmlns:p14="http://schemas.microsoft.com/office/powerpoint/2010/main" val="1253725192"/>
+        <p14:creationId xmlns:p14="http://schemas.microsoft.com/office/powerpoint/2010/main" val="2905247713"/>
       </p:ext>
     </p:extLst>
   </p:cSld>
@@ -15355,7 +15917,7 @@
 </p:sld>
 </file>
 
-<file path=ppt/slides/slide20.xml><?xml version="1.0" encoding="utf-8"?>
+<file path=ppt/slides/slide22.xml><?xml version="1.0" encoding="utf-8"?>
 <p:sld xmlns:a="http://schemas.openxmlformats.org/drawingml/2006/main" xmlns:r="http://schemas.openxmlformats.org/officeDocument/2006/relationships" xmlns:p="http://schemas.openxmlformats.org/presentationml/2006/main">
   <p:cSld>
     <p:spTree>
@@ -16224,7 +16786,7 @@
 </p:sld>
 </file>
 
-<file path=ppt/slides/slide21.xml><?xml version="1.0" encoding="utf-8"?>
+<file path=ppt/slides/slide23.xml><?xml version="1.0" encoding="utf-8"?>
 <p:sld xmlns:a="http://schemas.openxmlformats.org/drawingml/2006/main" xmlns:r="http://schemas.openxmlformats.org/officeDocument/2006/relationships" xmlns:p="http://schemas.openxmlformats.org/presentationml/2006/main">
   <p:cSld>
     <p:spTree>
@@ -17358,7 +17920,7 @@
 </p:sld>
 </file>
 
-<file path=ppt/slides/slide22.xml><?xml version="1.0" encoding="utf-8"?>
+<file path=ppt/slides/slide24.xml><?xml version="1.0" encoding="utf-8"?>
 <p:sld xmlns:a="http://schemas.openxmlformats.org/drawingml/2006/main" xmlns:r="http://schemas.openxmlformats.org/officeDocument/2006/relationships" xmlns:p="http://schemas.openxmlformats.org/presentationml/2006/main">
   <p:cSld>
     <p:spTree>
@@ -18471,7 +19033,7 @@
 </p:sld>
 </file>
 
-<file path=ppt/slides/slide23.xml><?xml version="1.0" encoding="utf-8"?>
+<file path=ppt/slides/slide25.xml><?xml version="1.0" encoding="utf-8"?>
 <p:sld xmlns:a="http://schemas.openxmlformats.org/drawingml/2006/main" xmlns:r="http://schemas.openxmlformats.org/officeDocument/2006/relationships" xmlns:p="http://schemas.openxmlformats.org/presentationml/2006/main">
   <p:cSld>
     <p:spTree>
@@ -18969,17 +19531,8 @@
               <a:rPr lang="en-US" altLang="en-US" sz="3200" dirty="0">
                 <a:latin typeface="Aptos Display" panose="020B0004020202020204" pitchFamily="34" charset="0"/>
               </a:rPr>
-              <a:t>Other multivariate methods of classification are too computer intensive (e.g. Bayesian </a:t>
-            </a:r>
-            <a:r>
-              <a:rPr lang="en-US" altLang="en-US" sz="3200">
-                <a:latin typeface="Aptos Display" panose="020B0004020202020204" pitchFamily="34" charset="0"/>
-              </a:rPr>
-              <a:t>clustering algorithms)</a:t>
-            </a:r>
-            <a:endParaRPr lang="en-US" altLang="en-US" sz="3200" dirty="0">
-              <a:latin typeface="Aptos Display" panose="020B0004020202020204" pitchFamily="34" charset="0"/>
-            </a:endParaRPr>
+              <a:t>Other multivariate methods of classification are too computer intensive (e.g. Bayesian clustering algorithms)</a:t>
+            </a:r>
           </a:p>
           <a:p>
             <a:pPr marL="342900" marR="0" lvl="0" indent="-342900" algn="l" defTabSz="914400" rtl="0" eaLnBrk="0" fontAlgn="base" latinLnBrk="0" hangingPunct="0">
@@ -19201,7 +19754,7 @@
         <p:spPr bwMode="auto">
           <a:xfrm>
             <a:off x="2590799" y="2705099"/>
-            <a:ext cx="13344525" cy="2062103"/>
+            <a:ext cx="13344525" cy="2554545"/>
           </a:xfrm>
           <a:prstGeom prst="rect">
             <a:avLst/>
@@ -19278,6 +19831,40 @@
               </a:rPr>
               <a:t>Method to reduce dimensionality in datasets while maintaining variability</a:t>
             </a:r>
+          </a:p>
+          <a:p>
+            <a:pPr marL="342900" marR="0" lvl="0" indent="-342900" algn="l" defTabSz="914400" rtl="0" eaLnBrk="0" fontAlgn="base" latinLnBrk="0" hangingPunct="0">
+              <a:lnSpc>
+                <a:spcPct val="100000"/>
+              </a:lnSpc>
+              <a:spcBef>
+                <a:spcPct val="0"/>
+              </a:spcBef>
+              <a:spcAft>
+                <a:spcPct val="0"/>
+              </a:spcAft>
+              <a:buClrTx/>
+              <a:buSzTx/>
+              <a:buFont typeface="Arial" panose="020B0604020202020204" pitchFamily="34" charset="0"/>
+              <a:buChar char="•"/>
+              <a:tabLst/>
+            </a:pPr>
+            <a:r>
+              <a:rPr lang="en-US" altLang="en-US" sz="3200" dirty="0">
+                <a:latin typeface="Aptos Display" panose="020B0004020202020204" pitchFamily="34" charset="0"/>
+              </a:rPr>
+              <a:t>Does not consider different in class</a:t>
+            </a:r>
+            <a:endParaRPr kumimoji="0" lang="en-US" altLang="en-US" sz="3200" b="0" i="0" u="none" strike="noStrike" cap="none" normalizeH="0" baseline="0" dirty="0">
+              <a:ln>
+                <a:noFill/>
+              </a:ln>
+              <a:solidFill>
+                <a:schemeClr val="tx1"/>
+              </a:solidFill>
+              <a:effectLst/>
+              <a:latin typeface="Aptos Display" panose="020B0004020202020204" pitchFamily="34" charset="0"/>
+            </a:endParaRPr>
           </a:p>
           <a:p>
             <a:pPr marL="342900" indent="-342900" eaLnBrk="0" fontAlgn="base" hangingPunct="0">
@@ -19811,7 +20398,7 @@
         <p:spPr bwMode="auto">
           <a:xfrm>
             <a:off x="2590799" y="2705099"/>
-            <a:ext cx="13344525" cy="2554545"/>
+            <a:ext cx="13344525" cy="3046988"/>
           </a:xfrm>
           <a:prstGeom prst="rect">
             <a:avLst/>
@@ -19888,6 +20475,40 @@
               </a:rPr>
               <a:t>A method for classifying observations by finding linear combinations of features that best separate classes</a:t>
             </a:r>
+          </a:p>
+          <a:p>
+            <a:pPr marL="342900" marR="0" lvl="0" indent="-342900" algn="l" defTabSz="914400" rtl="0" eaLnBrk="0" fontAlgn="base" latinLnBrk="0" hangingPunct="0">
+              <a:lnSpc>
+                <a:spcPct val="100000"/>
+              </a:lnSpc>
+              <a:spcBef>
+                <a:spcPct val="0"/>
+              </a:spcBef>
+              <a:spcAft>
+                <a:spcPct val="0"/>
+              </a:spcAft>
+              <a:buClrTx/>
+              <a:buSzTx/>
+              <a:buFont typeface="Arial" panose="020B0604020202020204" pitchFamily="34" charset="0"/>
+              <a:buChar char="•"/>
+              <a:tabLst/>
+            </a:pPr>
+            <a:r>
+              <a:rPr lang="en-US" altLang="en-US" sz="3200" dirty="0">
+                <a:latin typeface="Aptos Display" panose="020B0004020202020204" pitchFamily="34" charset="0"/>
+              </a:rPr>
+              <a:t>Can also be used for dimensionality reduction</a:t>
+            </a:r>
+            <a:endParaRPr kumimoji="0" lang="en-US" altLang="en-US" sz="3200" b="0" i="0" u="none" strike="noStrike" cap="none" normalizeH="0" baseline="0" dirty="0">
+              <a:ln>
+                <a:noFill/>
+              </a:ln>
+              <a:solidFill>
+                <a:schemeClr val="tx1"/>
+              </a:solidFill>
+              <a:effectLst/>
+              <a:latin typeface="Aptos Display" panose="020B0004020202020204" pitchFamily="34" charset="0"/>
+            </a:endParaRPr>
           </a:p>
           <a:p>
             <a:pPr marL="342900" marR="0" lvl="0" indent="-342900" algn="l" defTabSz="914400" rtl="0" eaLnBrk="0" fontAlgn="base" latinLnBrk="0" hangingPunct="0">
@@ -20143,7 +20764,7 @@
               <a:rPr lang="en-US" altLang="en-US" sz="3200" dirty="0">
                 <a:latin typeface="Aptos Display" panose="020B0004020202020204" pitchFamily="34" charset="0"/>
               </a:rPr>
-              <a:t>Graphical representation of data 3D -&gt; 2D</a:t>
+              <a:t>Graphical representation of data</a:t>
             </a:r>
             <a:endParaRPr kumimoji="0" lang="en-US" altLang="en-US" sz="3200" b="0" i="0" u="none" strike="noStrike" cap="none" normalizeH="0" baseline="0" dirty="0">
               <a:ln>
@@ -20160,10 +20781,10 @@
       </p:sp>
       <p:pic>
         <p:nvPicPr>
-          <p:cNvPr id="14" name="Picture 13">
+          <p:cNvPr id="3" name="Picture 2">
             <a:extLst>
               <a:ext uri="{FF2B5EF4-FFF2-40B4-BE49-F238E27FC236}">
-                <a16:creationId xmlns:a16="http://schemas.microsoft.com/office/drawing/2014/main" id="{D1F1BFD5-5F98-31FE-485B-73296F22FF58}"/>
+                <a16:creationId xmlns:a16="http://schemas.microsoft.com/office/drawing/2014/main" id="{8125E515-9310-CAC8-ED49-9C30D92EE1B9}"/>
               </a:ext>
             </a:extLst>
           </p:cNvPr>
@@ -20180,8 +20801,8 @@
         </p:blipFill>
         <p:spPr>
           <a:xfrm>
-            <a:off x="3200400" y="3543300"/>
-            <a:ext cx="5410200" cy="5674112"/>
+            <a:off x="9681884" y="4076700"/>
+            <a:ext cx="6667500" cy="4114800"/>
           </a:xfrm>
           <a:prstGeom prst="rect">
             <a:avLst/>
@@ -20190,10 +20811,10 @@
       </p:pic>
       <p:pic>
         <p:nvPicPr>
-          <p:cNvPr id="3" name="Picture 2">
+          <p:cNvPr id="4" name="Picture 3">
             <a:extLst>
               <a:ext uri="{FF2B5EF4-FFF2-40B4-BE49-F238E27FC236}">
-                <a16:creationId xmlns:a16="http://schemas.microsoft.com/office/drawing/2014/main" id="{8125E515-9310-CAC8-ED49-9C30D92EE1B9}"/>
+                <a16:creationId xmlns:a16="http://schemas.microsoft.com/office/drawing/2014/main" id="{EB9A8CF9-2B2F-8112-BF27-FF2A89EA0FEE}"/>
               </a:ext>
             </a:extLst>
           </p:cNvPr>
@@ -20210,7 +20831,7 @@
         </p:blipFill>
         <p:spPr>
           <a:xfrm>
-            <a:off x="9681884" y="4076700"/>
+            <a:off x="2595560" y="4076700"/>
             <a:ext cx="6667500" cy="4114800"/>
           </a:xfrm>
           <a:prstGeom prst="rect">
@@ -20637,7 +21258,7 @@
         <p:spPr bwMode="auto">
           <a:xfrm>
             <a:off x="2590799" y="2705099"/>
-            <a:ext cx="7772401" cy="3539430"/>
+            <a:ext cx="7772401" cy="4031873"/>
           </a:xfrm>
           <a:prstGeom prst="rect">
             <a:avLst/>
@@ -20770,7 +21391,25 @@
               <a:rPr lang="en-US" altLang="en-US" sz="3200" dirty="0">
                 <a:latin typeface="Aptos Display" panose="020B0004020202020204" pitchFamily="34" charset="0"/>
               </a:rPr>
-              <a:t>Discriminant Analysis (DA) has limitations that impede it from </a:t>
+              <a:t>Can handle more features than samples</a:t>
+            </a:r>
+          </a:p>
+          <a:p>
+            <a:pPr marL="800100" lvl="1" indent="-342900" eaLnBrk="0" fontAlgn="base" hangingPunct="0">
+              <a:spcBef>
+                <a:spcPct val="0"/>
+              </a:spcBef>
+              <a:spcAft>
+                <a:spcPct val="0"/>
+              </a:spcAft>
+              <a:buFont typeface="Arial" panose="020B0604020202020204" pitchFamily="34" charset="0"/>
+              <a:buChar char="•"/>
+            </a:pPr>
+            <a:r>
+              <a:rPr lang="en-US" altLang="en-US" sz="3200" dirty="0">
+                <a:latin typeface="Aptos Display" panose="020B0004020202020204" pitchFamily="34" charset="0"/>
+              </a:rPr>
+              <a:t>PCA step reduces feature size to be less than number of samples</a:t>
             </a:r>
             <a:endParaRPr kumimoji="0" lang="en-US" altLang="en-US" sz="3200" b="0" i="0" u="none" strike="noStrike" cap="none" normalizeH="0" baseline="0" dirty="0">
               <a:ln>

</xml_diff>